<commit_message>
Added server password reset
</commit_message>
<xml_diff>
--- a/Slides/Module 3 - Introduction to Databases.pptx
+++ b/Slides/Module 3 - Introduction to Databases.pptx
@@ -5,10 +5,10 @@
     <p:sldMasterId id="2147483660" r:id="rId4"/>
   </p:sldMasterIdLst>
   <p:notesMasterIdLst>
-    <p:notesMasterId r:id="rId48"/>
+    <p:notesMasterId r:id="rId49"/>
   </p:notesMasterIdLst>
   <p:handoutMasterIdLst>
-    <p:handoutMasterId r:id="rId49"/>
+    <p:handoutMasterId r:id="rId50"/>
   </p:handoutMasterIdLst>
   <p:sldIdLst>
     <p:sldId id="277" r:id="rId5"/>
@@ -48,12 +48,13 @@
     <p:sldId id="317" r:id="rId39"/>
     <p:sldId id="324" r:id="rId40"/>
     <p:sldId id="325" r:id="rId41"/>
-    <p:sldId id="326" r:id="rId42"/>
-    <p:sldId id="332" r:id="rId43"/>
-    <p:sldId id="321" r:id="rId44"/>
-    <p:sldId id="318" r:id="rId45"/>
-    <p:sldId id="322" r:id="rId46"/>
-    <p:sldId id="269" r:id="rId47"/>
+    <p:sldId id="336" r:id="rId42"/>
+    <p:sldId id="326" r:id="rId43"/>
+    <p:sldId id="332" r:id="rId44"/>
+    <p:sldId id="321" r:id="rId45"/>
+    <p:sldId id="318" r:id="rId46"/>
+    <p:sldId id="322" r:id="rId47"/>
+    <p:sldId id="269" r:id="rId48"/>
   </p:sldIdLst>
   <p:sldSz cx="12192000" cy="6858000"/>
   <p:notesSz cx="6858000" cy="9144000"/>
@@ -245,7 +246,7 @@
           <a:p>
             <a:fld id="{312E7B4A-039C-48A2-9B2C-AF16AA3873D8}" type="datetimeFigureOut">
               <a:rPr lang="en-US" smtClean="0"/>
-              <a:t>2/26/2015</a:t>
+              <a:t>3/2/2015</a:t>
             </a:fld>
             <a:endParaRPr lang="en-US"/>
           </a:p>
@@ -410,7 +411,7 @@
           <a:p>
             <a:fld id="{DA005A0C-54D9-45AA-87D4-C551D08DFCE1}" type="datetimeFigureOut">
               <a:rPr lang="en-US" smtClean="0"/>
-              <a:t>2/26/2015</a:t>
+              <a:t>3/2/2015</a:t>
             </a:fld>
             <a:endParaRPr lang="en-US"/>
           </a:p>
@@ -6618,7 +6619,7 @@
 </file>
 
 <file path=ppt/slides/slide20.xml><?xml version="1.0" encoding="utf-8"?>
-<p:sld xmlns:a="http://schemas.openxmlformats.org/drawingml/2006/main" xmlns:r="http://schemas.openxmlformats.org/officeDocument/2006/relationships" xmlns:p="http://schemas.openxmlformats.org/presentationml/2006/main">
+<p:sld xmlns:a="http://schemas.openxmlformats.org/drawingml/2006/main" xmlns:r="http://schemas.openxmlformats.org/officeDocument/2006/relationships" xmlns:p="http://schemas.openxmlformats.org/presentationml/2006/main" show="0">
   <p:cSld>
     <p:spTree>
       <p:nvGrpSpPr>
@@ -6686,6 +6687,14 @@
   <p:clrMapOvr>
     <a:masterClrMapping/>
   </p:clrMapOvr>
+  <mc:AlternateContent xmlns:mc="http://schemas.openxmlformats.org/markup-compatibility/2006">
+    <mc:Choice xmlns:p14="http://schemas.microsoft.com/office/powerpoint/2010/main" Requires="p14">
+      <p:transition spd="slow" p14:dur="2000"/>
+    </mc:Choice>
+    <mc:Fallback>
+      <p:transition spd="slow"/>
+    </mc:Fallback>
+  </mc:AlternateContent>
   <p:timing>
     <p:tnLst>
       <p:par>
@@ -6697,7 +6706,7 @@
 </file>
 
 <file path=ppt/slides/slide21.xml><?xml version="1.0" encoding="utf-8"?>
-<p:sld xmlns:a="http://schemas.openxmlformats.org/drawingml/2006/main" xmlns:r="http://schemas.openxmlformats.org/officeDocument/2006/relationships" xmlns:p="http://schemas.openxmlformats.org/presentationml/2006/main">
+<p:sld xmlns:a="http://schemas.openxmlformats.org/drawingml/2006/main" xmlns:r="http://schemas.openxmlformats.org/officeDocument/2006/relationships" xmlns:p="http://schemas.openxmlformats.org/presentationml/2006/main" show="0">
   <p:cSld>
     <p:spTree>
       <p:nvGrpSpPr>
@@ -6796,6 +6805,14 @@
   <p:clrMapOvr>
     <a:masterClrMapping/>
   </p:clrMapOvr>
+  <mc:AlternateContent xmlns:mc="http://schemas.openxmlformats.org/markup-compatibility/2006">
+    <mc:Choice xmlns:p14="http://schemas.microsoft.com/office/powerpoint/2010/main" Requires="p14">
+      <p:transition spd="slow" p14:dur="2000"/>
+    </mc:Choice>
+    <mc:Fallback>
+      <p:transition spd="slow"/>
+    </mc:Fallback>
+  </mc:AlternateContent>
   <p:timing>
     <p:tnLst>
       <p:par>
@@ -6807,7 +6824,7 @@
 </file>
 
 <file path=ppt/slides/slide22.xml><?xml version="1.0" encoding="utf-8"?>
-<p:sld xmlns:a="http://schemas.openxmlformats.org/drawingml/2006/main" xmlns:r="http://schemas.openxmlformats.org/officeDocument/2006/relationships" xmlns:p="http://schemas.openxmlformats.org/presentationml/2006/main">
+<p:sld xmlns:a="http://schemas.openxmlformats.org/drawingml/2006/main" xmlns:r="http://schemas.openxmlformats.org/officeDocument/2006/relationships" xmlns:p="http://schemas.openxmlformats.org/presentationml/2006/main" show="0">
   <p:cSld>
     <p:spTree>
       <p:nvGrpSpPr>
@@ -6944,6 +6961,14 @@
   <p:clrMapOvr>
     <a:masterClrMapping/>
   </p:clrMapOvr>
+  <mc:AlternateContent xmlns:mc="http://schemas.openxmlformats.org/markup-compatibility/2006">
+    <mc:Choice xmlns:p14="http://schemas.microsoft.com/office/powerpoint/2010/main" Requires="p14">
+      <p:transition spd="slow" p14:dur="2000"/>
+    </mc:Choice>
+    <mc:Fallback>
+      <p:transition spd="slow"/>
+    </mc:Fallback>
+  </mc:AlternateContent>
   <p:timing>
     <p:tnLst>
       <p:par>
@@ -7206,7 +7231,7 @@
 </file>
 
 <file path=ppt/slides/slide23.xml><?xml version="1.0" encoding="utf-8"?>
-<p:sld xmlns:a="http://schemas.openxmlformats.org/drawingml/2006/main" xmlns:r="http://schemas.openxmlformats.org/officeDocument/2006/relationships" xmlns:p="http://schemas.openxmlformats.org/presentationml/2006/main">
+<p:sld xmlns:a="http://schemas.openxmlformats.org/drawingml/2006/main" xmlns:r="http://schemas.openxmlformats.org/officeDocument/2006/relationships" xmlns:p="http://schemas.openxmlformats.org/presentationml/2006/main" show="0">
   <p:cSld>
     <p:spTree>
       <p:nvGrpSpPr>
@@ -7415,6 +7440,14 @@
   <p:clrMapOvr>
     <a:masterClrMapping/>
   </p:clrMapOvr>
+  <mc:AlternateContent xmlns:mc="http://schemas.openxmlformats.org/markup-compatibility/2006">
+    <mc:Choice xmlns:p14="http://schemas.microsoft.com/office/powerpoint/2010/main" Requires="p14">
+      <p:transition spd="slow" p14:dur="2000"/>
+    </mc:Choice>
+    <mc:Fallback>
+      <p:transition spd="slow"/>
+    </mc:Fallback>
+  </mc:AlternateContent>
   <p:timing>
     <p:tnLst>
       <p:par>
@@ -7729,7 +7762,7 @@
 </file>
 
 <file path=ppt/slides/slide24.xml><?xml version="1.0" encoding="utf-8"?>
-<p:sld xmlns:a="http://schemas.openxmlformats.org/drawingml/2006/main" xmlns:r="http://schemas.openxmlformats.org/officeDocument/2006/relationships" xmlns:p="http://schemas.openxmlformats.org/presentationml/2006/main">
+<p:sld xmlns:a="http://schemas.openxmlformats.org/drawingml/2006/main" xmlns:r="http://schemas.openxmlformats.org/officeDocument/2006/relationships" xmlns:p="http://schemas.openxmlformats.org/presentationml/2006/main" show="0">
   <p:cSld>
     <p:spTree>
       <p:nvGrpSpPr>
@@ -8429,6 +8462,14 @@
   <p:clrMapOvr>
     <a:masterClrMapping/>
   </p:clrMapOvr>
+  <mc:AlternateContent xmlns:mc="http://schemas.openxmlformats.org/markup-compatibility/2006">
+    <mc:Choice xmlns:p14="http://schemas.microsoft.com/office/powerpoint/2010/main" Requires="p14">
+      <p:transition spd="slow" p14:dur="2000"/>
+    </mc:Choice>
+    <mc:Fallback>
+      <p:transition spd="slow"/>
+    </mc:Fallback>
+  </mc:AlternateContent>
   <p:timing>
     <p:tnLst>
       <p:par>
@@ -10040,15 +10081,7 @@
             </a:r>
             <a:r>
               <a:rPr lang="en-CA" dirty="0" smtClean="0"/>
-              <a:t>	 	</a:t>
-            </a:r>
-            <a:r>
-              <a:rPr lang="en-CA" dirty="0" smtClean="0"/>
-              <a:t>NVARCHAR(50)</a:t>
-            </a:r>
-            <a:r>
-              <a:rPr lang="en-CA" dirty="0" smtClean="0"/>
-              <a:t>		NOT NULL,</a:t>
+              <a:t>	 	NVARCHAR(50)		NOT NULL,</a:t>
             </a:r>
           </a:p>
           <a:p>
@@ -11274,8 +11307,23 @@
             </a:pPr>
             <a:r>
               <a:rPr lang="en-CA" dirty="0" smtClean="0"/>
-              <a:t>Find out the server name and user name to connect to the database from SQL Server Management Studio</a:t>
-            </a:r>
+              <a:t>Find out the server name and user name to connect to the database from SQL Server Management </a:t>
+            </a:r>
+            <a:r>
+              <a:rPr lang="en-CA" dirty="0" smtClean="0"/>
+              <a:t>Studio</a:t>
+            </a:r>
+          </a:p>
+          <a:p>
+            <a:pPr marL="1028546" lvl="1" indent="-571500">
+              <a:buFont typeface="+mj-lt"/>
+              <a:buAutoNum type="romanUcPeriod"/>
+            </a:pPr>
+            <a:r>
+              <a:rPr lang="en-CA" dirty="0" smtClean="0"/>
+              <a:t>Set the password for our database server in Azure</a:t>
+            </a:r>
+            <a:endParaRPr lang="en-CA" dirty="0" smtClean="0"/>
           </a:p>
           <a:p>
             <a:pPr marL="1028546" lvl="1" indent="-571500">
@@ -11537,6 +11585,37 @@
                                   </p:childTnLst>
                                 </p:cTn>
                               </p:par>
+                              <p:par>
+                                <p:cTn id="19" presetID="1" presetClass="entr" presetSubtype="0" fill="hold" grpId="0" nodeType="withEffect">
+                                  <p:stCondLst>
+                                    <p:cond delay="0"/>
+                                  </p:stCondLst>
+                                  <p:childTnLst>
+                                    <p:set>
+                                      <p:cBhvr>
+                                        <p:cTn id="20" dur="1" fill="hold">
+                                          <p:stCondLst>
+                                            <p:cond delay="0"/>
+                                          </p:stCondLst>
+                                        </p:cTn>
+                                        <p:tgtEl>
+                                          <p:spTgt spid="3">
+                                            <p:txEl>
+                                              <p:pRg st="6" end="6"/>
+                                            </p:txEl>
+                                          </p:spTgt>
+                                        </p:tgtEl>
+                                        <p:attrNameLst>
+                                          <p:attrName>style.visibility</p:attrName>
+                                        </p:attrNameLst>
+                                      </p:cBhvr>
+                                      <p:to>
+                                        <p:strVal val="visible"/>
+                                      </p:to>
+                                    </p:set>
+                                  </p:childTnLst>
+                                </p:cTn>
+                              </p:par>
                             </p:childTnLst>
                           </p:cTn>
                         </p:par>
@@ -11874,7 +11953,7 @@
         <p:spPr/>
         <p:txBody>
           <a:bodyPr>
-            <a:normAutofit fontScale="85000" lnSpcReduction="20000"/>
+            <a:normAutofit/>
           </a:bodyPr>
           <a:lstStyle/>
           <a:p>
@@ -11912,32 +11991,12 @@
           <a:p>
             <a:r>
               <a:rPr lang="en-CA" dirty="0" smtClean="0"/>
-              <a:t>Note the server name and user name in the Connection string</a:t>
-            </a:r>
-          </a:p>
-          <a:p>
+              <a:t>Note the server name and user name in the Connection </a:t>
+            </a:r>
             <a:r>
               <a:rPr lang="en-CA" dirty="0" smtClean="0"/>
-              <a:t>By default the password is your Azure password, you can change this by going to the </a:t>
-            </a:r>
-            <a:r>
-              <a:rPr lang="en-CA" sz="3300" i="1" dirty="0" smtClean="0"/>
-              <a:t>DASHBOARD</a:t>
-            </a:r>
-            <a:r>
-              <a:rPr lang="en-CA" sz="3300" dirty="0" smtClean="0"/>
-              <a:t> </a:t>
-            </a:r>
-            <a:r>
-              <a:rPr lang="en-CA" dirty="0" smtClean="0"/>
-              <a:t>for your database server and choosing </a:t>
-            </a:r>
-            <a:r>
-              <a:rPr lang="en-CA" sz="3300" i="1" dirty="0" smtClean="0"/>
-              <a:t>Reset Administrator Password</a:t>
-            </a:r>
-          </a:p>
-          <a:p>
+              <a:t>string</a:t>
+            </a:r>
             <a:endParaRPr lang="en-CA" dirty="0" smtClean="0"/>
           </a:p>
         </p:txBody>
@@ -12348,55 +12407,6 @@
                       </p:childTnLst>
                     </p:cTn>
                   </p:par>
-                  <p:par>
-                    <p:cTn id="23" fill="hold">
-                      <p:stCondLst>
-                        <p:cond delay="indefinite"/>
-                      </p:stCondLst>
-                      <p:childTnLst>
-                        <p:par>
-                          <p:cTn id="24" fill="hold">
-                            <p:stCondLst>
-                              <p:cond delay="0"/>
-                            </p:stCondLst>
-                            <p:childTnLst>
-                              <p:par>
-                                <p:cTn id="25" presetID="1" presetClass="entr" presetSubtype="0" fill="hold" grpId="0" nodeType="clickEffect">
-                                  <p:stCondLst>
-                                    <p:cond delay="0"/>
-                                  </p:stCondLst>
-                                  <p:childTnLst>
-                                    <p:set>
-                                      <p:cBhvr>
-                                        <p:cTn id="26" dur="1" fill="hold">
-                                          <p:stCondLst>
-                                            <p:cond delay="0"/>
-                                          </p:stCondLst>
-                                        </p:cTn>
-                                        <p:tgtEl>
-                                          <p:spTgt spid="3">
-                                            <p:txEl>
-                                              <p:pRg st="3" end="3"/>
-                                            </p:txEl>
-                                          </p:spTgt>
-                                        </p:tgtEl>
-                                        <p:attrNameLst>
-                                          <p:attrName>style.visibility</p:attrName>
-                                        </p:attrNameLst>
-                                      </p:cBhvr>
-                                      <p:to>
-                                        <p:strVal val="visible"/>
-                                      </p:to>
-                                    </p:set>
-                                  </p:childTnLst>
-                                </p:cTn>
-                              </p:par>
-                            </p:childTnLst>
-                          </p:cTn>
-                        </p:par>
-                      </p:childTnLst>
-                    </p:cTn>
-                  </p:par>
                 </p:childTnLst>
               </p:cTn>
               <p:prevCondLst>
@@ -12444,6 +12454,76 @@
       </p:grpSpPr>
       <p:sp>
         <p:nvSpPr>
+          <p:cNvPr id="3" name="Content Placeholder 2"/>
+          <p:cNvSpPr>
+            <a:spLocks noGrp="1"/>
+          </p:cNvSpPr>
+          <p:nvPr>
+            <p:ph sz="half" idx="2"/>
+          </p:nvPr>
+        </p:nvSpPr>
+        <p:spPr/>
+        <p:txBody>
+          <a:bodyPr>
+            <a:normAutofit/>
+          </a:bodyPr>
+          <a:lstStyle/>
+          <a:p>
+            <a:r>
+              <a:rPr lang="en-CA" dirty="0" smtClean="0"/>
+              <a:t>Click on the server name for your database in the Azure portal</a:t>
+            </a:r>
+            <a:endParaRPr lang="en-CA" dirty="0" smtClean="0"/>
+          </a:p>
+          <a:p>
+            <a:r>
+              <a:rPr lang="en-CA" dirty="0" smtClean="0"/>
+              <a:t>Bring up the DASHBOARD for the server</a:t>
+            </a:r>
+            <a:endParaRPr lang="en-CA" sz="3600" i="1" dirty="0" smtClean="0"/>
+          </a:p>
+          <a:p>
+            <a:r>
+              <a:rPr lang="en-CA" dirty="0" smtClean="0"/>
+              <a:t>Select </a:t>
+            </a:r>
+            <a:r>
+              <a:rPr lang="en-CA" i="1" dirty="0" smtClean="0"/>
+              <a:t>reset administrator password</a:t>
+            </a:r>
+            <a:r>
+              <a:rPr lang="en-CA" i="1" dirty="0"/>
+              <a:t> </a:t>
+            </a:r>
+            <a:r>
+              <a:rPr lang="en-CA" dirty="0" smtClean="0"/>
+              <a:t>and enter a password for the database server</a:t>
+            </a:r>
+            <a:endParaRPr lang="en-CA" dirty="0" smtClean="0"/>
+          </a:p>
+        </p:txBody>
+      </p:sp>
+      <p:sp>
+        <p:nvSpPr>
+          <p:cNvPr id="4" name="Content Placeholder 3"/>
+          <p:cNvSpPr>
+            <a:spLocks noGrp="1"/>
+          </p:cNvSpPr>
+          <p:nvPr>
+            <p:ph sz="quarter" idx="4"/>
+          </p:nvPr>
+        </p:nvSpPr>
+        <p:spPr/>
+        <p:txBody>
+          <a:bodyPr/>
+          <a:lstStyle/>
+          <a:p>
+            <a:endParaRPr lang="en-US" dirty="0"/>
+          </a:p>
+        </p:txBody>
+      </p:sp>
+      <p:sp>
+        <p:nvSpPr>
           <p:cNvPr id="2" name="Title 1"/>
           <p:cNvSpPr>
             <a:spLocks noGrp="1"/>
@@ -12460,8 +12540,471 @@
           <a:lstStyle/>
           <a:p>
             <a:r>
+              <a:rPr lang="en-CA" dirty="0"/>
+              <a:t>iii) Set the password for our database server in Azure </a:t>
+            </a:r>
+            <a:endParaRPr lang="en-US" dirty="0"/>
+          </a:p>
+        </p:txBody>
+      </p:sp>
+      <p:pic>
+        <p:nvPicPr>
+          <p:cNvPr id="1026" name="Picture 2" descr="C:\Users\sibach\AppData\Local\Temp\SNAGHTML675fdd0.PNG"/>
+          <p:cNvPicPr>
+            <a:picLocks noChangeAspect="1" noChangeArrowheads="1"/>
+          </p:cNvPicPr>
+          <p:nvPr/>
+        </p:nvPicPr>
+        <p:blipFill>
+          <a:blip r:embed="rId2">
+            <a:extLst>
+              <a:ext uri="{28A0092B-C50C-407E-A947-70E740481C1C}">
+                <a14:useLocalDpi xmlns:a14="http://schemas.microsoft.com/office/drawing/2010/main" val="0"/>
+              </a:ext>
+            </a:extLst>
+          </a:blip>
+          <a:srcRect/>
+          <a:stretch>
+            <a:fillRect/>
+          </a:stretch>
+        </p:blipFill>
+        <p:spPr bwMode="auto">
+          <a:xfrm>
+            <a:off x="5990814" y="1326007"/>
+            <a:ext cx="6340918" cy="1875170"/>
+          </a:xfrm>
+          <a:prstGeom prst="rect">
+            <a:avLst/>
+          </a:prstGeom>
+          <a:noFill/>
+          <a:extLst>
+            <a:ext uri="{909E8E84-426E-40DD-AFC4-6F175D3DCCD1}">
+              <a14:hiddenFill xmlns:a14="http://schemas.microsoft.com/office/drawing/2010/main">
+                <a:solidFill>
+                  <a:srgbClr val="FFFFFF"/>
+                </a:solidFill>
+              </a14:hiddenFill>
+            </a:ext>
+          </a:extLst>
+        </p:spPr>
+      </p:pic>
+      <p:pic>
+        <p:nvPicPr>
+          <p:cNvPr id="7" name="Picture 6"/>
+          <p:cNvPicPr>
+            <a:picLocks noChangeAspect="1"/>
+          </p:cNvPicPr>
+          <p:nvPr/>
+        </p:nvPicPr>
+        <p:blipFill>
+          <a:blip r:embed="rId3"/>
+          <a:stretch>
+            <a:fillRect/>
+          </a:stretch>
+        </p:blipFill>
+        <p:spPr>
+          <a:xfrm>
+            <a:off x="5971550" y="2680894"/>
+            <a:ext cx="6227504" cy="2912690"/>
+          </a:xfrm>
+          <a:prstGeom prst="rect">
+            <a:avLst/>
+          </a:prstGeom>
+        </p:spPr>
+      </p:pic>
+      <p:pic>
+        <p:nvPicPr>
+          <p:cNvPr id="8" name="Picture 7"/>
+          <p:cNvPicPr>
+            <a:picLocks noChangeAspect="1"/>
+          </p:cNvPicPr>
+          <p:nvPr/>
+        </p:nvPicPr>
+        <p:blipFill>
+          <a:blip r:embed="rId4"/>
+          <a:stretch>
+            <a:fillRect/>
+          </a:stretch>
+        </p:blipFill>
+        <p:spPr>
+          <a:xfrm>
+            <a:off x="5838872" y="4050777"/>
+            <a:ext cx="6239714" cy="2319419"/>
+          </a:xfrm>
+          <a:prstGeom prst="rect">
+            <a:avLst/>
+          </a:prstGeom>
+        </p:spPr>
+      </p:pic>
+    </p:spTree>
+    <p:extLst>
+      <p:ext uri="{BB962C8B-B14F-4D97-AF65-F5344CB8AC3E}">
+        <p14:creationId xmlns:p14="http://schemas.microsoft.com/office/powerpoint/2010/main" val="4166200224"/>
+      </p:ext>
+    </p:extLst>
+  </p:cSld>
+  <p:clrMapOvr>
+    <a:masterClrMapping/>
+  </p:clrMapOvr>
+  <p:timing>
+    <p:tnLst>
+      <p:par>
+        <p:cTn id="1" dur="indefinite" restart="never" nodeType="tmRoot">
+          <p:childTnLst>
+            <p:seq concurrent="1" nextAc="seek">
+              <p:cTn id="2" dur="indefinite" nodeType="mainSeq">
+                <p:childTnLst>
+                  <p:par>
+                    <p:cTn id="3" fill="hold">
+                      <p:stCondLst>
+                        <p:cond delay="indefinite"/>
+                      </p:stCondLst>
+                      <p:childTnLst>
+                        <p:par>
+                          <p:cTn id="4" fill="hold">
+                            <p:stCondLst>
+                              <p:cond delay="0"/>
+                            </p:stCondLst>
+                            <p:childTnLst>
+                              <p:par>
+                                <p:cTn id="5" presetID="1" presetClass="entr" presetSubtype="0" fill="hold" grpId="0" nodeType="clickEffect">
+                                  <p:stCondLst>
+                                    <p:cond delay="0"/>
+                                  </p:stCondLst>
+                                  <p:childTnLst>
+                                    <p:set>
+                                      <p:cBhvr>
+                                        <p:cTn id="6" dur="1" fill="hold">
+                                          <p:stCondLst>
+                                            <p:cond delay="0"/>
+                                          </p:stCondLst>
+                                        </p:cTn>
+                                        <p:tgtEl>
+                                          <p:spTgt spid="3">
+                                            <p:txEl>
+                                              <p:pRg st="0" end="0"/>
+                                            </p:txEl>
+                                          </p:spTgt>
+                                        </p:tgtEl>
+                                        <p:attrNameLst>
+                                          <p:attrName>style.visibility</p:attrName>
+                                        </p:attrNameLst>
+                                      </p:cBhvr>
+                                      <p:to>
+                                        <p:strVal val="visible"/>
+                                      </p:to>
+                                    </p:set>
+                                  </p:childTnLst>
+                                </p:cTn>
+                              </p:par>
+                              <p:par>
+                                <p:cTn id="7" presetID="1" presetClass="entr" presetSubtype="0" fill="hold" nodeType="withEffect">
+                                  <p:stCondLst>
+                                    <p:cond delay="0"/>
+                                  </p:stCondLst>
+                                  <p:childTnLst>
+                                    <p:set>
+                                      <p:cBhvr>
+                                        <p:cTn id="8" dur="1" fill="hold">
+                                          <p:stCondLst>
+                                            <p:cond delay="0"/>
+                                          </p:stCondLst>
+                                        </p:cTn>
+                                        <p:tgtEl>
+                                          <p:spTgt spid="1026"/>
+                                        </p:tgtEl>
+                                        <p:attrNameLst>
+                                          <p:attrName>style.visibility</p:attrName>
+                                        </p:attrNameLst>
+                                      </p:cBhvr>
+                                      <p:to>
+                                        <p:strVal val="visible"/>
+                                      </p:to>
+                                    </p:set>
+                                  </p:childTnLst>
+                                </p:cTn>
+                              </p:par>
+                            </p:childTnLst>
+                          </p:cTn>
+                        </p:par>
+                      </p:childTnLst>
+                    </p:cTn>
+                  </p:par>
+                  <p:par>
+                    <p:cTn id="9" fill="hold">
+                      <p:stCondLst>
+                        <p:cond delay="indefinite"/>
+                      </p:stCondLst>
+                      <p:childTnLst>
+                        <p:par>
+                          <p:cTn id="10" fill="hold">
+                            <p:stCondLst>
+                              <p:cond delay="0"/>
+                            </p:stCondLst>
+                            <p:childTnLst>
+                              <p:par>
+                                <p:cTn id="11" presetID="1" presetClass="entr" presetSubtype="0" fill="hold" grpId="0" nodeType="clickEffect">
+                                  <p:stCondLst>
+                                    <p:cond delay="0"/>
+                                  </p:stCondLst>
+                                  <p:childTnLst>
+                                    <p:set>
+                                      <p:cBhvr>
+                                        <p:cTn id="12" dur="1" fill="hold">
+                                          <p:stCondLst>
+                                            <p:cond delay="0"/>
+                                          </p:stCondLst>
+                                        </p:cTn>
+                                        <p:tgtEl>
+                                          <p:spTgt spid="3">
+                                            <p:txEl>
+                                              <p:pRg st="1" end="1"/>
+                                            </p:txEl>
+                                          </p:spTgt>
+                                        </p:tgtEl>
+                                        <p:attrNameLst>
+                                          <p:attrName>style.visibility</p:attrName>
+                                        </p:attrNameLst>
+                                      </p:cBhvr>
+                                      <p:to>
+                                        <p:strVal val="visible"/>
+                                      </p:to>
+                                    </p:set>
+                                  </p:childTnLst>
+                                </p:cTn>
+                              </p:par>
+                              <p:par>
+                                <p:cTn id="13" presetID="1" presetClass="exit" presetSubtype="0" fill="hold" nodeType="withEffect">
+                                  <p:stCondLst>
+                                    <p:cond delay="0"/>
+                                  </p:stCondLst>
+                                  <p:childTnLst>
+                                    <p:set>
+                                      <p:cBhvr>
+                                        <p:cTn id="14" dur="1" fill="hold">
+                                          <p:stCondLst>
+                                            <p:cond delay="0"/>
+                                          </p:stCondLst>
+                                        </p:cTn>
+                                        <p:tgtEl>
+                                          <p:spTgt spid="1026"/>
+                                        </p:tgtEl>
+                                        <p:attrNameLst>
+                                          <p:attrName>style.visibility</p:attrName>
+                                        </p:attrNameLst>
+                                      </p:cBhvr>
+                                      <p:to>
+                                        <p:strVal val="hidden"/>
+                                      </p:to>
+                                    </p:set>
+                                  </p:childTnLst>
+                                </p:cTn>
+                              </p:par>
+                              <p:par>
+                                <p:cTn id="15" presetID="1" presetClass="entr" presetSubtype="0" fill="hold" nodeType="withEffect">
+                                  <p:stCondLst>
+                                    <p:cond delay="0"/>
+                                  </p:stCondLst>
+                                  <p:childTnLst>
+                                    <p:set>
+                                      <p:cBhvr>
+                                        <p:cTn id="16" dur="1" fill="hold">
+                                          <p:stCondLst>
+                                            <p:cond delay="0"/>
+                                          </p:stCondLst>
+                                        </p:cTn>
+                                        <p:tgtEl>
+                                          <p:spTgt spid="7"/>
+                                        </p:tgtEl>
+                                        <p:attrNameLst>
+                                          <p:attrName>style.visibility</p:attrName>
+                                        </p:attrNameLst>
+                                      </p:cBhvr>
+                                      <p:to>
+                                        <p:strVal val="visible"/>
+                                      </p:to>
+                                    </p:set>
+                                  </p:childTnLst>
+                                </p:cTn>
+                              </p:par>
+                            </p:childTnLst>
+                          </p:cTn>
+                        </p:par>
+                      </p:childTnLst>
+                    </p:cTn>
+                  </p:par>
+                  <p:par>
+                    <p:cTn id="17" fill="hold">
+                      <p:stCondLst>
+                        <p:cond delay="indefinite"/>
+                      </p:stCondLst>
+                      <p:childTnLst>
+                        <p:par>
+                          <p:cTn id="18" fill="hold">
+                            <p:stCondLst>
+                              <p:cond delay="0"/>
+                            </p:stCondLst>
+                            <p:childTnLst>
+                              <p:par>
+                                <p:cTn id="19" presetID="1" presetClass="entr" presetSubtype="0" fill="hold" grpId="0" nodeType="clickEffect">
+                                  <p:stCondLst>
+                                    <p:cond delay="0"/>
+                                  </p:stCondLst>
+                                  <p:childTnLst>
+                                    <p:set>
+                                      <p:cBhvr>
+                                        <p:cTn id="20" dur="1" fill="hold">
+                                          <p:stCondLst>
+                                            <p:cond delay="0"/>
+                                          </p:stCondLst>
+                                        </p:cTn>
+                                        <p:tgtEl>
+                                          <p:spTgt spid="3">
+                                            <p:txEl>
+                                              <p:pRg st="2" end="2"/>
+                                            </p:txEl>
+                                          </p:spTgt>
+                                        </p:tgtEl>
+                                        <p:attrNameLst>
+                                          <p:attrName>style.visibility</p:attrName>
+                                        </p:attrNameLst>
+                                      </p:cBhvr>
+                                      <p:to>
+                                        <p:strVal val="visible"/>
+                                      </p:to>
+                                    </p:set>
+                                  </p:childTnLst>
+                                </p:cTn>
+                              </p:par>
+                              <p:par>
+                                <p:cTn id="21" presetID="1" presetClass="exit" presetSubtype="0" fill="hold" nodeType="withEffect">
+                                  <p:stCondLst>
+                                    <p:cond delay="0"/>
+                                  </p:stCondLst>
+                                  <p:childTnLst>
+                                    <p:set>
+                                      <p:cBhvr>
+                                        <p:cTn id="22" dur="1" fill="hold">
+                                          <p:stCondLst>
+                                            <p:cond delay="0"/>
+                                          </p:stCondLst>
+                                        </p:cTn>
+                                        <p:tgtEl>
+                                          <p:spTgt spid="7"/>
+                                        </p:tgtEl>
+                                        <p:attrNameLst>
+                                          <p:attrName>style.visibility</p:attrName>
+                                        </p:attrNameLst>
+                                      </p:cBhvr>
+                                      <p:to>
+                                        <p:strVal val="hidden"/>
+                                      </p:to>
+                                    </p:set>
+                                  </p:childTnLst>
+                                </p:cTn>
+                              </p:par>
+                              <p:par>
+                                <p:cTn id="23" presetID="1" presetClass="entr" presetSubtype="0" fill="hold" nodeType="withEffect">
+                                  <p:stCondLst>
+                                    <p:cond delay="0"/>
+                                  </p:stCondLst>
+                                  <p:childTnLst>
+                                    <p:set>
+                                      <p:cBhvr>
+                                        <p:cTn id="24" dur="1" fill="hold">
+                                          <p:stCondLst>
+                                            <p:cond delay="0"/>
+                                          </p:stCondLst>
+                                        </p:cTn>
+                                        <p:tgtEl>
+                                          <p:spTgt spid="8"/>
+                                        </p:tgtEl>
+                                        <p:attrNameLst>
+                                          <p:attrName>style.visibility</p:attrName>
+                                        </p:attrNameLst>
+                                      </p:cBhvr>
+                                      <p:to>
+                                        <p:strVal val="visible"/>
+                                      </p:to>
+                                    </p:set>
+                                  </p:childTnLst>
+                                </p:cTn>
+                              </p:par>
+                            </p:childTnLst>
+                          </p:cTn>
+                        </p:par>
+                      </p:childTnLst>
+                    </p:cTn>
+                  </p:par>
+                </p:childTnLst>
+              </p:cTn>
+              <p:prevCondLst>
+                <p:cond evt="onPrev" delay="0">
+                  <p:tgtEl>
+                    <p:sldTgt/>
+                  </p:tgtEl>
+                </p:cond>
+              </p:prevCondLst>
+              <p:nextCondLst>
+                <p:cond evt="onNext" delay="0">
+                  <p:tgtEl>
+                    <p:sldTgt/>
+                  </p:tgtEl>
+                </p:cond>
+              </p:nextCondLst>
+            </p:seq>
+          </p:childTnLst>
+        </p:cTn>
+      </p:par>
+    </p:tnLst>
+    <p:bldLst>
+      <p:bldP spid="3" grpId="0" uiExpand="1" build="p"/>
+    </p:bldLst>
+  </p:timing>
+</p:sld>
+</file>
+
+<file path=ppt/slides/slide39.xml><?xml version="1.0" encoding="utf-8"?>
+<p:sld xmlns:a="http://schemas.openxmlformats.org/drawingml/2006/main" xmlns:r="http://schemas.openxmlformats.org/officeDocument/2006/relationships" xmlns:p="http://schemas.openxmlformats.org/presentationml/2006/main">
+  <p:cSld>
+    <p:spTree>
+      <p:nvGrpSpPr>
+        <p:cNvPr id="1" name=""/>
+        <p:cNvGrpSpPr/>
+        <p:nvPr/>
+      </p:nvGrpSpPr>
+      <p:grpSpPr>
+        <a:xfrm>
+          <a:off x="0" y="0"/>
+          <a:ext cx="0" cy="0"/>
+          <a:chOff x="0" y="0"/>
+          <a:chExt cx="0" cy="0"/>
+        </a:xfrm>
+      </p:grpSpPr>
+      <p:sp>
+        <p:nvSpPr>
+          <p:cNvPr id="2" name="Title 1"/>
+          <p:cNvSpPr>
+            <a:spLocks noGrp="1"/>
+          </p:cNvSpPr>
+          <p:nvPr>
+            <p:ph type="title"/>
+          </p:nvPr>
+        </p:nvSpPr>
+        <p:spPr/>
+        <p:txBody>
+          <a:bodyPr>
+            <a:normAutofit fontScale="90000"/>
+          </a:bodyPr>
+          <a:lstStyle/>
+          <a:p>
+            <a:r>
               <a:rPr lang="en-CA" dirty="0" smtClean="0"/>
-              <a:t>iii) Connect using SQL Server Management Studio</a:t>
+              <a:t>iv) </a:t>
+            </a:r>
+            <a:r>
+              <a:rPr lang="en-CA" dirty="0" smtClean="0"/>
+              <a:t>Connect using SQL Server Management Studio</a:t>
             </a:r>
             <a:endParaRPr lang="en-US" dirty="0"/>
           </a:p>
@@ -12571,352 +13114,6 @@
         <p:cTn id="1" dur="indefinite" restart="never" nodeType="tmRoot"/>
       </p:par>
     </p:tnLst>
-  </p:timing>
-</p:sld>
-</file>
-
-<file path=ppt/slides/slide39.xml><?xml version="1.0" encoding="utf-8"?>
-<p:sld xmlns:a="http://schemas.openxmlformats.org/drawingml/2006/main" xmlns:r="http://schemas.openxmlformats.org/officeDocument/2006/relationships" xmlns:p="http://schemas.openxmlformats.org/presentationml/2006/main">
-  <p:cSld>
-    <p:spTree>
-      <p:nvGrpSpPr>
-        <p:cNvPr id="1" name=""/>
-        <p:cNvGrpSpPr/>
-        <p:nvPr/>
-      </p:nvGrpSpPr>
-      <p:grpSpPr>
-        <a:xfrm>
-          <a:off x="0" y="0"/>
-          <a:ext cx="0" cy="0"/>
-          <a:chOff x="0" y="0"/>
-          <a:chExt cx="0" cy="0"/>
-        </a:xfrm>
-      </p:grpSpPr>
-      <p:sp>
-        <p:nvSpPr>
-          <p:cNvPr id="2" name="Title 1"/>
-          <p:cNvSpPr>
-            <a:spLocks noGrp="1"/>
-          </p:cNvSpPr>
-          <p:nvPr>
-            <p:ph type="title"/>
-          </p:nvPr>
-        </p:nvSpPr>
-        <p:spPr/>
-        <p:txBody>
-          <a:bodyPr/>
-          <a:lstStyle/>
-          <a:p>
-            <a:r>
-              <a:rPr lang="en-CA" dirty="0" smtClean="0"/>
-              <a:t>iv) Type SQL Command to create your table</a:t>
-            </a:r>
-            <a:endParaRPr lang="en-US" dirty="0"/>
-          </a:p>
-        </p:txBody>
-      </p:sp>
-      <p:sp>
-        <p:nvSpPr>
-          <p:cNvPr id="3" name="Content Placeholder 2"/>
-          <p:cNvSpPr>
-            <a:spLocks noGrp="1"/>
-          </p:cNvSpPr>
-          <p:nvPr>
-            <p:ph sz="quarter" idx="10"/>
-          </p:nvPr>
-        </p:nvSpPr>
-        <p:spPr>
-          <a:xfrm>
-            <a:off x="379413" y="1388226"/>
-            <a:ext cx="11265740" cy="2359021"/>
-          </a:xfrm>
-        </p:spPr>
-        <p:txBody>
-          <a:bodyPr/>
-          <a:lstStyle/>
-          <a:p>
-            <a:r>
-              <a:rPr lang="en-CA" dirty="0" smtClean="0"/>
-              <a:t>In SQL Server Management studio, expand your database, right click </a:t>
-            </a:r>
-            <a:r>
-              <a:rPr lang="en-CA" b="1" dirty="0" smtClean="0"/>
-              <a:t>Tables</a:t>
-            </a:r>
-            <a:r>
-              <a:rPr lang="en-CA" dirty="0" smtClean="0"/>
-              <a:t> and select </a:t>
-            </a:r>
-            <a:r>
-              <a:rPr lang="en-CA" b="1" i="1" dirty="0" smtClean="0"/>
-              <a:t>New Table </a:t>
-            </a:r>
-          </a:p>
-          <a:p>
-            <a:r>
-              <a:rPr lang="en-CA" dirty="0" smtClean="0"/>
-              <a:t>Type the SQL Command to create your table</a:t>
-            </a:r>
-          </a:p>
-          <a:p>
-            <a:r>
-              <a:rPr lang="en-CA" dirty="0" smtClean="0"/>
-              <a:t>NOTE: SQL Azure requires a PRIMARY KEY for each table</a:t>
-            </a:r>
-          </a:p>
-        </p:txBody>
-      </p:sp>
-      <p:pic>
-        <p:nvPicPr>
-          <p:cNvPr id="5" name="Picture 4"/>
-          <p:cNvPicPr>
-            <a:picLocks noChangeAspect="1"/>
-          </p:cNvPicPr>
-          <p:nvPr/>
-        </p:nvPicPr>
-        <p:blipFill>
-          <a:blip r:embed="rId2"/>
-          <a:stretch>
-            <a:fillRect/>
-          </a:stretch>
-        </p:blipFill>
-        <p:spPr>
-          <a:xfrm>
-            <a:off x="2325349" y="3734611"/>
-            <a:ext cx="6195914" cy="2981622"/>
-          </a:xfrm>
-          <a:prstGeom prst="rect">
-            <a:avLst/>
-          </a:prstGeom>
-        </p:spPr>
-      </p:pic>
-      <p:sp>
-        <p:nvSpPr>
-          <p:cNvPr id="6" name="Rectangle 5"/>
-          <p:cNvSpPr/>
-          <p:nvPr/>
-        </p:nvSpPr>
-        <p:spPr>
-          <a:xfrm>
-            <a:off x="7614745" y="5612524"/>
-            <a:ext cx="780393" cy="244366"/>
-          </a:xfrm>
-          <a:prstGeom prst="rect">
-            <a:avLst/>
-          </a:prstGeom>
-          <a:noFill/>
-          <a:ln w="28575">
-            <a:solidFill>
-              <a:srgbClr val="FF0000"/>
-            </a:solidFill>
-          </a:ln>
-        </p:spPr>
-        <p:style>
-          <a:lnRef idx="2">
-            <a:schemeClr val="accent1">
-              <a:shade val="50000"/>
-            </a:schemeClr>
-          </a:lnRef>
-          <a:fillRef idx="1">
-            <a:schemeClr val="accent1"/>
-          </a:fillRef>
-          <a:effectRef idx="0">
-            <a:schemeClr val="accent1"/>
-          </a:effectRef>
-          <a:fontRef idx="minor">
-            <a:schemeClr val="lt1"/>
-          </a:fontRef>
-        </p:style>
-        <p:txBody>
-          <a:bodyPr rtlCol="0" anchor="ctr"/>
-          <a:lstStyle/>
-          <a:p>
-            <a:pPr algn="ctr"/>
-            <a:endParaRPr lang="en-US"/>
-          </a:p>
-        </p:txBody>
-      </p:sp>
-      <p:cxnSp>
-        <p:nvCxnSpPr>
-          <p:cNvPr id="8" name="Straight Arrow Connector 7"/>
-          <p:cNvCxnSpPr/>
-          <p:nvPr/>
-        </p:nvCxnSpPr>
-        <p:spPr>
-          <a:xfrm>
-            <a:off x="7874876" y="5044966"/>
-            <a:ext cx="7883" cy="543910"/>
-          </a:xfrm>
-          <a:prstGeom prst="straightConnector1">
-            <a:avLst/>
-          </a:prstGeom>
-          <a:ln w="28575">
-            <a:solidFill>
-              <a:srgbClr val="FF0000"/>
-            </a:solidFill>
-            <a:tailEnd type="triangle"/>
-          </a:ln>
-        </p:spPr>
-        <p:style>
-          <a:lnRef idx="1">
-            <a:schemeClr val="accent1"/>
-          </a:lnRef>
-          <a:fillRef idx="0">
-            <a:schemeClr val="accent1"/>
-          </a:fillRef>
-          <a:effectRef idx="0">
-            <a:schemeClr val="accent1"/>
-          </a:effectRef>
-          <a:fontRef idx="minor">
-            <a:schemeClr val="tx1"/>
-          </a:fontRef>
-        </p:style>
-      </p:cxnSp>
-    </p:spTree>
-    <p:extLst>
-      <p:ext uri="{BB962C8B-B14F-4D97-AF65-F5344CB8AC3E}">
-        <p14:creationId xmlns:p14="http://schemas.microsoft.com/office/powerpoint/2010/main" val="1036476143"/>
-      </p:ext>
-    </p:extLst>
-  </p:cSld>
-  <p:clrMapOvr>
-    <a:masterClrMapping/>
-  </p:clrMapOvr>
-  <p:timing>
-    <p:tnLst>
-      <p:par>
-        <p:cTn id="1" dur="indefinite" restart="never" nodeType="tmRoot">
-          <p:childTnLst>
-            <p:seq concurrent="1" nextAc="seek">
-              <p:cTn id="2" dur="indefinite" nodeType="mainSeq">
-                <p:childTnLst>
-                  <p:par>
-                    <p:cTn id="3" fill="hold">
-                      <p:stCondLst>
-                        <p:cond delay="indefinite"/>
-                      </p:stCondLst>
-                      <p:childTnLst>
-                        <p:par>
-                          <p:cTn id="4" fill="hold">
-                            <p:stCondLst>
-                              <p:cond delay="0"/>
-                            </p:stCondLst>
-                            <p:childTnLst>
-                              <p:par>
-                                <p:cTn id="5" presetID="1" presetClass="entr" presetSubtype="0" fill="hold" nodeType="clickEffect">
-                                  <p:stCondLst>
-                                    <p:cond delay="0"/>
-                                  </p:stCondLst>
-                                  <p:childTnLst>
-                                    <p:set>
-                                      <p:cBhvr>
-                                        <p:cTn id="6" dur="1" fill="hold">
-                                          <p:stCondLst>
-                                            <p:cond delay="0"/>
-                                          </p:stCondLst>
-                                        </p:cTn>
-                                        <p:tgtEl>
-                                          <p:spTgt spid="3">
-                                            <p:txEl>
-                                              <p:pRg st="2" end="2"/>
-                                            </p:txEl>
-                                          </p:spTgt>
-                                        </p:tgtEl>
-                                        <p:attrNameLst>
-                                          <p:attrName>style.visibility</p:attrName>
-                                        </p:attrNameLst>
-                                      </p:cBhvr>
-                                      <p:to>
-                                        <p:strVal val="visible"/>
-                                      </p:to>
-                                    </p:set>
-                                  </p:childTnLst>
-                                </p:cTn>
-                              </p:par>
-                              <p:par>
-                                <p:cTn id="7" presetID="1" presetClass="entr" presetSubtype="0" fill="hold" nodeType="withEffect">
-                                  <p:stCondLst>
-                                    <p:cond delay="0"/>
-                                  </p:stCondLst>
-                                  <p:childTnLst>
-                                    <p:set>
-                                      <p:cBhvr>
-                                        <p:cTn id="8" dur="1" fill="hold">
-                                          <p:stCondLst>
-                                            <p:cond delay="0"/>
-                                          </p:stCondLst>
-                                        </p:cTn>
-                                        <p:tgtEl>
-                                          <p:spTgt spid="8"/>
-                                        </p:tgtEl>
-                                        <p:attrNameLst>
-                                          <p:attrName>style.visibility</p:attrName>
-                                        </p:attrNameLst>
-                                      </p:cBhvr>
-                                      <p:to>
-                                        <p:strVal val="visible"/>
-                                      </p:to>
-                                    </p:set>
-                                  </p:childTnLst>
-                                </p:cTn>
-                              </p:par>
-                              <p:par>
-                                <p:cTn id="9" presetID="1" presetClass="entr" presetSubtype="0" fill="hold" grpId="0" nodeType="withEffect">
-                                  <p:stCondLst>
-                                    <p:cond delay="0"/>
-                                  </p:stCondLst>
-                                  <p:childTnLst>
-                                    <p:set>
-                                      <p:cBhvr>
-                                        <p:cTn id="10" dur="1" fill="hold">
-                                          <p:stCondLst>
-                                            <p:cond delay="0"/>
-                                          </p:stCondLst>
-                                        </p:cTn>
-                                        <p:tgtEl>
-                                          <p:spTgt spid="6"/>
-                                        </p:tgtEl>
-                                        <p:attrNameLst>
-                                          <p:attrName>style.visibility</p:attrName>
-                                        </p:attrNameLst>
-                                      </p:cBhvr>
-                                      <p:to>
-                                        <p:strVal val="visible"/>
-                                      </p:to>
-                                    </p:set>
-                                  </p:childTnLst>
-                                </p:cTn>
-                              </p:par>
-                            </p:childTnLst>
-                          </p:cTn>
-                        </p:par>
-                      </p:childTnLst>
-                    </p:cTn>
-                  </p:par>
-                </p:childTnLst>
-              </p:cTn>
-              <p:prevCondLst>
-                <p:cond evt="onPrev" delay="0">
-                  <p:tgtEl>
-                    <p:sldTgt/>
-                  </p:tgtEl>
-                </p:cond>
-              </p:prevCondLst>
-              <p:nextCondLst>
-                <p:cond evt="onNext" delay="0">
-                  <p:tgtEl>
-                    <p:sldTgt/>
-                  </p:tgtEl>
-                </p:cond>
-              </p:nextCondLst>
-            </p:seq>
-          </p:childTnLst>
-        </p:cTn>
-      </p:par>
-    </p:tnLst>
-    <p:bldLst>
-      <p:bldP spid="6" grpId="0" animBg="1"/>
-    </p:bldLst>
   </p:timing>
 </p:sld>
 </file>
@@ -13262,7 +13459,7 @@
       </p:grpSpPr>
       <p:sp>
         <p:nvSpPr>
-          <p:cNvPr id="4" name="Title 3"/>
+          <p:cNvPr id="2" name="Title 1"/>
           <p:cNvSpPr>
             <a:spLocks noGrp="1"/>
           </p:cNvSpPr>
@@ -13276,17 +13473,178 @@
           <a:lstStyle/>
           <a:p>
             <a:r>
-              <a:rPr lang="en-US" dirty="0" smtClean="0"/>
-              <a:t>Create tables in Microsoft Azure SQL Database</a:t>
+              <a:rPr lang="en-CA" dirty="0" smtClean="0"/>
+              <a:t>v</a:t>
+            </a:r>
+            <a:r>
+              <a:rPr lang="en-CA" dirty="0" smtClean="0"/>
+              <a:t>) Type SQL Command to create your table</a:t>
             </a:r>
             <a:endParaRPr lang="en-US" dirty="0"/>
           </a:p>
         </p:txBody>
       </p:sp>
+      <p:sp>
+        <p:nvSpPr>
+          <p:cNvPr id="3" name="Content Placeholder 2"/>
+          <p:cNvSpPr>
+            <a:spLocks noGrp="1"/>
+          </p:cNvSpPr>
+          <p:nvPr>
+            <p:ph sz="quarter" idx="10"/>
+          </p:nvPr>
+        </p:nvSpPr>
+        <p:spPr>
+          <a:xfrm>
+            <a:off x="379413" y="1388226"/>
+            <a:ext cx="11265740" cy="2359021"/>
+          </a:xfrm>
+        </p:spPr>
+        <p:txBody>
+          <a:bodyPr/>
+          <a:lstStyle/>
+          <a:p>
+            <a:r>
+              <a:rPr lang="en-CA" dirty="0" smtClean="0"/>
+              <a:t>In SQL Server Management studio, expand your database, right click </a:t>
+            </a:r>
+            <a:r>
+              <a:rPr lang="en-CA" b="1" dirty="0" smtClean="0"/>
+              <a:t>Tables</a:t>
+            </a:r>
+            <a:r>
+              <a:rPr lang="en-CA" dirty="0" smtClean="0"/>
+              <a:t> and select </a:t>
+            </a:r>
+            <a:r>
+              <a:rPr lang="en-CA" b="1" i="1" dirty="0" smtClean="0"/>
+              <a:t>New Table </a:t>
+            </a:r>
+          </a:p>
+          <a:p>
+            <a:r>
+              <a:rPr lang="en-CA" dirty="0" smtClean="0"/>
+              <a:t>Type the SQL Command to create your table</a:t>
+            </a:r>
+          </a:p>
+          <a:p>
+            <a:r>
+              <a:rPr lang="en-CA" dirty="0" smtClean="0"/>
+              <a:t>NOTE: SQL Azure requires a PRIMARY KEY for each table</a:t>
+            </a:r>
+          </a:p>
+        </p:txBody>
+      </p:sp>
+      <p:pic>
+        <p:nvPicPr>
+          <p:cNvPr id="5" name="Picture 4"/>
+          <p:cNvPicPr>
+            <a:picLocks noChangeAspect="1"/>
+          </p:cNvPicPr>
+          <p:nvPr/>
+        </p:nvPicPr>
+        <p:blipFill>
+          <a:blip r:embed="rId2"/>
+          <a:stretch>
+            <a:fillRect/>
+          </a:stretch>
+        </p:blipFill>
+        <p:spPr>
+          <a:xfrm>
+            <a:off x="2325349" y="3734611"/>
+            <a:ext cx="6195914" cy="2981622"/>
+          </a:xfrm>
+          <a:prstGeom prst="rect">
+            <a:avLst/>
+          </a:prstGeom>
+        </p:spPr>
+      </p:pic>
+      <p:sp>
+        <p:nvSpPr>
+          <p:cNvPr id="6" name="Rectangle 5"/>
+          <p:cNvSpPr/>
+          <p:nvPr/>
+        </p:nvSpPr>
+        <p:spPr>
+          <a:xfrm>
+            <a:off x="7614745" y="5612524"/>
+            <a:ext cx="780393" cy="244366"/>
+          </a:xfrm>
+          <a:prstGeom prst="rect">
+            <a:avLst/>
+          </a:prstGeom>
+          <a:noFill/>
+          <a:ln w="28575">
+            <a:solidFill>
+              <a:srgbClr val="FF0000"/>
+            </a:solidFill>
+          </a:ln>
+        </p:spPr>
+        <p:style>
+          <a:lnRef idx="2">
+            <a:schemeClr val="accent1">
+              <a:shade val="50000"/>
+            </a:schemeClr>
+          </a:lnRef>
+          <a:fillRef idx="1">
+            <a:schemeClr val="accent1"/>
+          </a:fillRef>
+          <a:effectRef idx="0">
+            <a:schemeClr val="accent1"/>
+          </a:effectRef>
+          <a:fontRef idx="minor">
+            <a:schemeClr val="lt1"/>
+          </a:fontRef>
+        </p:style>
+        <p:txBody>
+          <a:bodyPr rtlCol="0" anchor="ctr"/>
+          <a:lstStyle/>
+          <a:p>
+            <a:pPr algn="ctr"/>
+            <a:endParaRPr lang="en-US"/>
+          </a:p>
+        </p:txBody>
+      </p:sp>
+      <p:cxnSp>
+        <p:nvCxnSpPr>
+          <p:cNvPr id="8" name="Straight Arrow Connector 7"/>
+          <p:cNvCxnSpPr/>
+          <p:nvPr/>
+        </p:nvCxnSpPr>
+        <p:spPr>
+          <a:xfrm>
+            <a:off x="7874876" y="5044966"/>
+            <a:ext cx="7883" cy="543910"/>
+          </a:xfrm>
+          <a:prstGeom prst="straightConnector1">
+            <a:avLst/>
+          </a:prstGeom>
+          <a:ln w="28575">
+            <a:solidFill>
+              <a:srgbClr val="FF0000"/>
+            </a:solidFill>
+            <a:tailEnd type="triangle"/>
+          </a:ln>
+        </p:spPr>
+        <p:style>
+          <a:lnRef idx="1">
+            <a:schemeClr val="accent1"/>
+          </a:lnRef>
+          <a:fillRef idx="0">
+            <a:schemeClr val="accent1"/>
+          </a:fillRef>
+          <a:effectRef idx="0">
+            <a:schemeClr val="accent1"/>
+          </a:effectRef>
+          <a:fontRef idx="minor">
+            <a:schemeClr val="tx1"/>
+          </a:fontRef>
+        </p:style>
+      </p:cxnSp>
     </p:spTree>
     <p:extLst>
       <p:ext uri="{BB962C8B-B14F-4D97-AF65-F5344CB8AC3E}">
-        <p14:creationId xmlns:p14="http://schemas.microsoft.com/office/powerpoint/2010/main" val="3717519341"/>
+        <p14:creationId xmlns:p14="http://schemas.microsoft.com/office/powerpoint/2010/main" val="1036476143"/>
       </p:ext>
     </p:extLst>
   </p:cSld>
@@ -13296,9 +13654,138 @@
   <p:timing>
     <p:tnLst>
       <p:par>
-        <p:cTn id="1" dur="indefinite" restart="never" nodeType="tmRoot"/>
+        <p:cTn id="1" dur="indefinite" restart="never" nodeType="tmRoot">
+          <p:childTnLst>
+            <p:seq concurrent="1" nextAc="seek">
+              <p:cTn id="2" dur="indefinite" nodeType="mainSeq">
+                <p:childTnLst>
+                  <p:par>
+                    <p:cTn id="3" fill="hold">
+                      <p:stCondLst>
+                        <p:cond delay="indefinite"/>
+                      </p:stCondLst>
+                      <p:childTnLst>
+                        <p:par>
+                          <p:cTn id="4" fill="hold">
+                            <p:stCondLst>
+                              <p:cond delay="0"/>
+                            </p:stCondLst>
+                            <p:childTnLst>
+                              <p:par>
+                                <p:cTn id="5" presetID="1" presetClass="entr" presetSubtype="0" fill="hold" nodeType="clickEffect">
+                                  <p:stCondLst>
+                                    <p:cond delay="0"/>
+                                  </p:stCondLst>
+                                  <p:childTnLst>
+                                    <p:set>
+                                      <p:cBhvr>
+                                        <p:cTn id="6" dur="1" fill="hold">
+                                          <p:stCondLst>
+                                            <p:cond delay="0"/>
+                                          </p:stCondLst>
+                                        </p:cTn>
+                                        <p:tgtEl>
+                                          <p:spTgt spid="3">
+                                            <p:txEl>
+                                              <p:pRg st="2" end="2"/>
+                                            </p:txEl>
+                                          </p:spTgt>
+                                        </p:tgtEl>
+                                        <p:attrNameLst>
+                                          <p:attrName>style.visibility</p:attrName>
+                                        </p:attrNameLst>
+                                      </p:cBhvr>
+                                      <p:to>
+                                        <p:strVal val="visible"/>
+                                      </p:to>
+                                    </p:set>
+                                  </p:childTnLst>
+                                </p:cTn>
+                              </p:par>
+                              <p:par>
+                                <p:cTn id="7" presetID="1" presetClass="entr" presetSubtype="0" fill="hold" nodeType="withEffect">
+                                  <p:stCondLst>
+                                    <p:cond delay="0"/>
+                                  </p:stCondLst>
+                                  <p:childTnLst>
+                                    <p:set>
+                                      <p:cBhvr>
+                                        <p:cTn id="8" dur="1" fill="hold">
+                                          <p:stCondLst>
+                                            <p:cond delay="0"/>
+                                          </p:stCondLst>
+                                        </p:cTn>
+                                        <p:tgtEl>
+                                          <p:spTgt spid="8"/>
+                                        </p:tgtEl>
+                                        <p:attrNameLst>
+                                          <p:attrName>style.visibility</p:attrName>
+                                        </p:attrNameLst>
+                                      </p:cBhvr>
+                                      <p:to>
+                                        <p:strVal val="visible"/>
+                                      </p:to>
+                                    </p:set>
+                                  </p:childTnLst>
+                                </p:cTn>
+                              </p:par>
+                              <p:par>
+                                <p:cTn id="9" presetID="1" presetClass="entr" presetSubtype="0" fill="hold" grpId="0" nodeType="withEffect">
+                                  <p:stCondLst>
+                                    <p:cond delay="0"/>
+                                  </p:stCondLst>
+                                  <p:childTnLst>
+                                    <p:set>
+                                      <p:cBhvr>
+                                        <p:cTn id="10" dur="1" fill="hold">
+                                          <p:stCondLst>
+                                            <p:cond delay="0"/>
+                                          </p:stCondLst>
+                                        </p:cTn>
+                                        <p:tgtEl>
+                                          <p:spTgt spid="6"/>
+                                        </p:tgtEl>
+                                        <p:attrNameLst>
+                                          <p:attrName>style.visibility</p:attrName>
+                                        </p:attrNameLst>
+                                      </p:cBhvr>
+                                      <p:to>
+                                        <p:strVal val="visible"/>
+                                      </p:to>
+                                    </p:set>
+                                  </p:childTnLst>
+                                </p:cTn>
+                              </p:par>
+                            </p:childTnLst>
+                          </p:cTn>
+                        </p:par>
+                      </p:childTnLst>
+                    </p:cTn>
+                  </p:par>
+                </p:childTnLst>
+              </p:cTn>
+              <p:prevCondLst>
+                <p:cond evt="onPrev" delay="0">
+                  <p:tgtEl>
+                    <p:sldTgt/>
+                  </p:tgtEl>
+                </p:cond>
+              </p:prevCondLst>
+              <p:nextCondLst>
+                <p:cond evt="onNext" delay="0">
+                  <p:tgtEl>
+                    <p:sldTgt/>
+                  </p:tgtEl>
+                </p:cond>
+              </p:nextCondLst>
+            </p:seq>
+          </p:childTnLst>
+        </p:cTn>
       </p:par>
     </p:tnLst>
+    <p:bldLst>
+      <p:bldP spid="6" grpId="0" animBg="1"/>
+    </p:bldLst>
   </p:timing>
 </p:sld>
 </file>
@@ -13322,7 +13809,7 @@
       </p:grpSpPr>
       <p:sp>
         <p:nvSpPr>
-          <p:cNvPr id="2" name="Title 1"/>
+          <p:cNvPr id="4" name="Title 3"/>
           <p:cNvSpPr>
             <a:spLocks noGrp="1"/>
           </p:cNvSpPr>
@@ -13336,69 +13823,8 @@
           <a:lstStyle/>
           <a:p>
             <a:r>
-              <a:rPr lang="en-CA" dirty="0" smtClean="0"/>
-              <a:t>Hopefully you noticed</a:t>
-            </a:r>
-            <a:endParaRPr lang="en-US" dirty="0"/>
-          </a:p>
-        </p:txBody>
-      </p:sp>
-      <p:sp>
-        <p:nvSpPr>
-          <p:cNvPr id="3" name="Content Placeholder 2"/>
-          <p:cNvSpPr>
-            <a:spLocks noGrp="1"/>
-          </p:cNvSpPr>
-          <p:nvPr>
-            <p:ph sz="quarter" idx="10"/>
-          </p:nvPr>
-        </p:nvSpPr>
-        <p:spPr/>
-        <p:txBody>
-          <a:bodyPr/>
-          <a:lstStyle/>
-          <a:p>
-            <a:r>
-              <a:rPr lang="en-CA" dirty="0" smtClean="0"/>
-              <a:t>The syntax and tools vary slightly but the basic method for setting up a database and tables in your database is very similar no matter which product you use.</a:t>
-            </a:r>
-          </a:p>
-          <a:p>
-            <a:r>
-              <a:rPr lang="en-CA" dirty="0" smtClean="0"/>
-              <a:t>To learn more about </a:t>
-            </a:r>
-            <a:r>
-              <a:rPr lang="en-CA" dirty="0" smtClean="0">
-                <a:hlinkClick r:id="rId2"/>
-              </a:rPr>
-              <a:t>SQL Server </a:t>
-            </a:r>
-            <a:endParaRPr lang="en-CA" dirty="0" smtClean="0"/>
-          </a:p>
-          <a:p>
-            <a:r>
-              <a:rPr lang="en-CA" dirty="0" smtClean="0"/>
-              <a:t>To learn more about </a:t>
-            </a:r>
-            <a:r>
-              <a:rPr lang="en-CA" dirty="0" smtClean="0">
-                <a:hlinkClick r:id="rId3"/>
-              </a:rPr>
-              <a:t>MySQL</a:t>
-            </a:r>
-            <a:endParaRPr lang="en-CA" dirty="0" smtClean="0"/>
-          </a:p>
-          <a:p>
-            <a:r>
-              <a:rPr lang="en-CA" dirty="0" smtClean="0"/>
-              <a:t>To learn more about </a:t>
-            </a:r>
-            <a:r>
-              <a:rPr lang="en-CA" dirty="0" smtClean="0">
-                <a:hlinkClick r:id="rId4"/>
-              </a:rPr>
-              <a:t>Microsoft Azure SQL Database</a:t>
+              <a:rPr lang="en-US" dirty="0" smtClean="0"/>
+              <a:t>Create tables in Microsoft Azure SQL Database</a:t>
             </a:r>
             <a:endParaRPr lang="en-US" dirty="0"/>
           </a:p>
@@ -13407,7 +13833,7 @@
     </p:spTree>
     <p:extLst>
       <p:ext uri="{BB962C8B-B14F-4D97-AF65-F5344CB8AC3E}">
-        <p14:creationId xmlns:p14="http://schemas.microsoft.com/office/powerpoint/2010/main" val="86722551"/>
+        <p14:creationId xmlns:p14="http://schemas.microsoft.com/office/powerpoint/2010/main" val="3717519341"/>
       </p:ext>
     </p:extLst>
   </p:cSld>
@@ -13458,7 +13884,7 @@
           <a:p>
             <a:r>
               <a:rPr lang="en-CA" dirty="0" smtClean="0"/>
-              <a:t>What did we learn?</a:t>
+              <a:t>Hopefully you noticed</a:t>
             </a:r>
             <a:endParaRPr lang="en-US" dirty="0"/>
           </a:p>
@@ -13481,6 +13907,127 @@
           <a:p>
             <a:r>
               <a:rPr lang="en-CA" dirty="0" smtClean="0"/>
+              <a:t>The syntax and tools vary slightly but the basic method for setting up a database and tables in your database is very similar no matter which product you use.</a:t>
+            </a:r>
+          </a:p>
+          <a:p>
+            <a:r>
+              <a:rPr lang="en-CA" dirty="0" smtClean="0"/>
+              <a:t>To learn more about </a:t>
+            </a:r>
+            <a:r>
+              <a:rPr lang="en-CA" dirty="0" smtClean="0">
+                <a:hlinkClick r:id="rId2"/>
+              </a:rPr>
+              <a:t>SQL Server </a:t>
+            </a:r>
+            <a:endParaRPr lang="en-CA" dirty="0" smtClean="0"/>
+          </a:p>
+          <a:p>
+            <a:r>
+              <a:rPr lang="en-CA" dirty="0" smtClean="0"/>
+              <a:t>To learn more about </a:t>
+            </a:r>
+            <a:r>
+              <a:rPr lang="en-CA" dirty="0" smtClean="0">
+                <a:hlinkClick r:id="rId3"/>
+              </a:rPr>
+              <a:t>MySQL</a:t>
+            </a:r>
+            <a:endParaRPr lang="en-CA" dirty="0" smtClean="0"/>
+          </a:p>
+          <a:p>
+            <a:r>
+              <a:rPr lang="en-CA" dirty="0" smtClean="0"/>
+              <a:t>To learn more about </a:t>
+            </a:r>
+            <a:r>
+              <a:rPr lang="en-CA" dirty="0" smtClean="0">
+                <a:hlinkClick r:id="rId4"/>
+              </a:rPr>
+              <a:t>Microsoft Azure SQL Database</a:t>
+            </a:r>
+            <a:endParaRPr lang="en-US" dirty="0"/>
+          </a:p>
+        </p:txBody>
+      </p:sp>
+    </p:spTree>
+    <p:extLst>
+      <p:ext uri="{BB962C8B-B14F-4D97-AF65-F5344CB8AC3E}">
+        <p14:creationId xmlns:p14="http://schemas.microsoft.com/office/powerpoint/2010/main" val="86722551"/>
+      </p:ext>
+    </p:extLst>
+  </p:cSld>
+  <p:clrMapOvr>
+    <a:masterClrMapping/>
+  </p:clrMapOvr>
+  <p:timing>
+    <p:tnLst>
+      <p:par>
+        <p:cTn id="1" dur="indefinite" restart="never" nodeType="tmRoot"/>
+      </p:par>
+    </p:tnLst>
+  </p:timing>
+</p:sld>
+</file>
+
+<file path=ppt/slides/slide43.xml><?xml version="1.0" encoding="utf-8"?>
+<p:sld xmlns:a="http://schemas.openxmlformats.org/drawingml/2006/main" xmlns:r="http://schemas.openxmlformats.org/officeDocument/2006/relationships" xmlns:p="http://schemas.openxmlformats.org/presentationml/2006/main">
+  <p:cSld>
+    <p:spTree>
+      <p:nvGrpSpPr>
+        <p:cNvPr id="1" name=""/>
+        <p:cNvGrpSpPr/>
+        <p:nvPr/>
+      </p:nvGrpSpPr>
+      <p:grpSpPr>
+        <a:xfrm>
+          <a:off x="0" y="0"/>
+          <a:ext cx="0" cy="0"/>
+          <a:chOff x="0" y="0"/>
+          <a:chExt cx="0" cy="0"/>
+        </a:xfrm>
+      </p:grpSpPr>
+      <p:sp>
+        <p:nvSpPr>
+          <p:cNvPr id="2" name="Title 1"/>
+          <p:cNvSpPr>
+            <a:spLocks noGrp="1"/>
+          </p:cNvSpPr>
+          <p:nvPr>
+            <p:ph type="title"/>
+          </p:nvPr>
+        </p:nvSpPr>
+        <p:spPr/>
+        <p:txBody>
+          <a:bodyPr/>
+          <a:lstStyle/>
+          <a:p>
+            <a:r>
+              <a:rPr lang="en-CA" dirty="0" smtClean="0"/>
+              <a:t>What did we learn?</a:t>
+            </a:r>
+            <a:endParaRPr lang="en-US" dirty="0"/>
+          </a:p>
+        </p:txBody>
+      </p:sp>
+      <p:sp>
+        <p:nvSpPr>
+          <p:cNvPr id="3" name="Content Placeholder 2"/>
+          <p:cNvSpPr>
+            <a:spLocks noGrp="1"/>
+          </p:cNvSpPr>
+          <p:nvPr>
+            <p:ph sz="quarter" idx="10"/>
+          </p:nvPr>
+        </p:nvSpPr>
+        <p:spPr/>
+        <p:txBody>
+          <a:bodyPr/>
+          <a:lstStyle/>
+          <a:p>
+            <a:r>
+              <a:rPr lang="en-CA" dirty="0" smtClean="0"/>
               <a:t>What products you can choose from for relational databases</a:t>
             </a:r>
           </a:p>
@@ -13501,14 +14048,11 @@
             <a:pPr lvl="1"/>
             <a:r>
               <a:rPr lang="en-CA" dirty="0" smtClean="0"/>
-              <a:t>MySQL</a:t>
-            </a:r>
-          </a:p>
-          <a:p>
-            <a:pPr lvl="1"/>
+              <a:t>Microsoft </a:t>
+            </a:r>
             <a:r>
               <a:rPr lang="en-CA" dirty="0" smtClean="0"/>
-              <a:t>Microsoft Azure SQL Database</a:t>
+              <a:t>Azure SQL Database</a:t>
             </a:r>
             <a:endParaRPr lang="en-US" dirty="0"/>
           </a:p>
@@ -13534,7 +14078,7 @@
 </p:sld>
 </file>
 
-<file path=ppt/slides/slide43.xml><?xml version="1.0" encoding="utf-8"?>
+<file path=ppt/slides/slide44.xml><?xml version="1.0" encoding="utf-8"?>
 <p:sld xmlns:a="http://schemas.openxmlformats.org/drawingml/2006/main" xmlns:r="http://schemas.openxmlformats.org/officeDocument/2006/relationships" xmlns:p="http://schemas.openxmlformats.org/presentationml/2006/main">
   <p:cSld>
     <p:spTree>
@@ -20641,6 +21185,15 @@
 </file>
 
 <file path=customXml/item1.xml><?xml version="1.0" encoding="utf-8"?>
+<?mso-contentType ?>
+<FormTemplates xmlns="http://schemas.microsoft.com/sharepoint/v3/contenttype/forms">
+  <Display>DocumentLibraryForm</Display>
+  <Edit>DocumentLibraryForm</Edit>
+  <New>DocumentLibraryForm</New>
+</FormTemplates>
+</file>
+
+<file path=customXml/item2.xml><?xml version="1.0" encoding="utf-8"?>
 <p:properties xmlns:p="http://schemas.microsoft.com/office/2006/metadata/properties" xmlns:xsi="http://www.w3.org/2001/XMLSchema-instance" xmlns:pc="http://schemas.microsoft.com/office/infopath/2007/PartnerControls">
   <documentManagement>
     <TaxCatchAll xmlns="230e9df3-be65-4c73-a93b-d1236ebd677e"/>
@@ -20651,15 +21204,6 @@
     </TaxKeywordTaxHTField>
   </documentManagement>
 </p:properties>
-</file>
-
-<file path=customXml/item2.xml><?xml version="1.0" encoding="utf-8"?>
-<?mso-contentType ?>
-<FormTemplates xmlns="http://schemas.microsoft.com/sharepoint/v3/contenttype/forms">
-  <Display>DocumentLibraryForm</Display>
-  <Edit>DocumentLibraryForm</Edit>
-  <New>DocumentLibraryForm</New>
-</FormTemplates>
 </file>
 
 <file path=customXml/item3.xml><?xml version="1.0" encoding="utf-8"?>
@@ -20845,6 +21389,14 @@
 </file>
 
 <file path=customXml/itemProps1.xml><?xml version="1.0" encoding="utf-8"?>
+<ds:datastoreItem xmlns:ds="http://schemas.openxmlformats.org/officeDocument/2006/customXml" ds:itemID="{B0CA13EC-1D3C-4D6F-8D1C-E8A452CFC79A}">
+  <ds:schemaRefs>
+    <ds:schemaRef ds:uri="http://schemas.microsoft.com/sharepoint/v3/contenttype/forms"/>
+  </ds:schemaRefs>
+</ds:datastoreItem>
+</file>
+
+<file path=customXml/itemProps2.xml><?xml version="1.0" encoding="utf-8"?>
 <ds:datastoreItem xmlns:ds="http://schemas.openxmlformats.org/officeDocument/2006/customXml" ds:itemID="{7025FDD9-4C58-4084-9F89-0E6ADD6FFF55}">
   <ds:schemaRefs>
     <ds:schemaRef ds:uri="230e9df3-be65-4c73-a93b-d1236ebd677e"/>
@@ -20858,14 +21410,6 @@
     <ds:schemaRef ds:uri="http://schemas.microsoft.com/office/infopath/2007/PartnerControls"/>
     <ds:schemaRef ds:uri="http://schemas.microsoft.com/sharepoint/v3"/>
     <ds:schemaRef ds:uri="http://www.w3.org/XML/1998/namespace"/>
-  </ds:schemaRefs>
-</ds:datastoreItem>
-</file>
-
-<file path=customXml/itemProps2.xml><?xml version="1.0" encoding="utf-8"?>
-<ds:datastoreItem xmlns:ds="http://schemas.openxmlformats.org/officeDocument/2006/customXml" ds:itemID="{B0CA13EC-1D3C-4D6F-8D1C-E8A452CFC79A}">
-  <ds:schemaRefs>
-    <ds:schemaRef ds:uri="http://schemas.microsoft.com/sharepoint/v3/contenttype/forms"/>
   </ds:schemaRefs>
 </ds:datastoreItem>
 </file>

</xml_diff>